<commit_message>
weekly update of google drive
</commit_message>
<xml_diff>
--- a/docs/CPE_308/meetings/Virtual Assistant Progress 1.pptx
+++ b/docs/CPE_308/meetings/Virtual Assistant Progress 1.pptx
@@ -9,16 +9,18 @@
   </p:notesMasterIdLst>
   <p:sldIdLst>
     <p:sldId id="256" r:id="rId5"/>
+    <p:sldId id="257" r:id="rId6"/>
+    <p:sldId id="258" r:id="rId7"/>
   </p:sldIdLst>
   <p:sldSz cy="5143500" cx="9144000"/>
   <p:notesSz cx="6858000" cy="9144000"/>
   <p:embeddedFontLst>
     <p:embeddedFont>
       <p:font typeface="Roboto"/>
-      <p:regular r:id="rId6"/>
-      <p:bold r:id="rId7"/>
-      <p:italic r:id="rId8"/>
-      <p:boldItalic r:id="rId9"/>
+      <p:regular r:id="rId8"/>
+      <p:bold r:id="rId9"/>
+      <p:italic r:id="rId10"/>
+      <p:boldItalic r:id="rId11"/>
     </p:embeddedFont>
   </p:embeddedFontLst>
   <p:defaultTextStyle>
@@ -429,6 +431,196 @@
       <p:sp>
         <p:nvSpPr>
           <p:cNvPr id="65" name="Shape 65"/>
+          <p:cNvSpPr txBox="1"/>
+          <p:nvPr>
+            <p:ph idx="1" type="body"/>
+          </p:nvPr>
+        </p:nvSpPr>
+        <p:spPr>
+          <a:xfrm>
+            <a:off x="685800" y="4343400"/>
+            <a:ext cx="5486400" cy="4114800"/>
+          </a:xfrm>
+          <a:prstGeom prst="rect">
+            <a:avLst/>
+          </a:prstGeom>
+        </p:spPr>
+        <p:txBody>
+          <a:bodyPr anchorCtr="0" anchor="t" bIns="91425" lIns="91425" rIns="91425" tIns="91425">
+            <a:noAutofit/>
+          </a:bodyPr>
+          <a:lstStyle/>
+          <a:p>
+            <a:pPr lvl="0">
+              <a:spcBef>
+                <a:spcPts val="0"/>
+              </a:spcBef>
+              <a:buNone/>
+            </a:pPr>
+            <a:r>
+              <a:t/>
+            </a:r>
+            <a:endParaRPr/>
+          </a:p>
+        </p:txBody>
+      </p:sp>
+    </p:spTree>
+  </p:cSld>
+  <p:clrMapOvr>
+    <a:masterClrMapping/>
+  </p:clrMapOvr>
+</p:notes>
+</file>
+
+<file path=ppt/notesSlides/notesSlide2.xml><?xml version="1.0" encoding="utf-8"?>
+<p:notes xmlns:a="http://schemas.openxmlformats.org/drawingml/2006/main" xmlns:r="http://schemas.openxmlformats.org/officeDocument/2006/relationships" xmlns:mc="http://schemas.openxmlformats.org/markup-compatibility/2006" xmlns:mv="urn:schemas-microsoft-com:mac:vml" xmlns:p="http://schemas.openxmlformats.org/presentationml/2006/main" xmlns:c="http://schemas.openxmlformats.org/drawingml/2006/chart" xmlns:dgm="http://schemas.openxmlformats.org/drawingml/2006/diagram" xmlns:o="urn:schemas-microsoft-com:office:office" xmlns:v="urn:schemas-microsoft-com:vml" xmlns:pvml="urn:schemas-microsoft-com:office:powerpoint" xmlns:com="http://schemas.openxmlformats.org/drawingml/2006/compatibility" xmlns:p14="http://schemas.microsoft.com/office/powerpoint/2010/main" showMasterPhAnim="0" showMasterSp="0">
+  <p:cSld>
+    <p:spTree>
+      <p:nvGrpSpPr>
+        <p:cNvPr id="69" name="Shape 69"/>
+        <p:cNvGrpSpPr/>
+        <p:nvPr/>
+      </p:nvGrpSpPr>
+      <p:grpSpPr>
+        <a:xfrm>
+          <a:off x="0" y="0"/>
+          <a:ext cx="0" cy="0"/>
+          <a:chOff x="0" y="0"/>
+          <a:chExt cx="0" cy="0"/>
+        </a:xfrm>
+      </p:grpSpPr>
+      <p:sp>
+        <p:nvSpPr>
+          <p:cNvPr id="70" name="Shape 70"/>
+          <p:cNvSpPr/>
+          <p:nvPr>
+            <p:ph idx="2" type="sldImg"/>
+          </p:nvPr>
+        </p:nvSpPr>
+        <p:spPr>
+          <a:xfrm>
+            <a:off x="381300" y="685800"/>
+            <a:ext cx="6096000" cy="3429000"/>
+          </a:xfrm>
+          <a:custGeom>
+            <a:pathLst>
+              <a:path extrusionOk="0" h="120000" w="120000">
+                <a:moveTo>
+                  <a:pt x="0" y="0"/>
+                </a:moveTo>
+                <a:lnTo>
+                  <a:pt x="120000" y="0"/>
+                </a:lnTo>
+                <a:lnTo>
+                  <a:pt x="120000" y="120000"/>
+                </a:lnTo>
+                <a:lnTo>
+                  <a:pt x="0" y="120000"/>
+                </a:lnTo>
+                <a:close/>
+              </a:path>
+            </a:pathLst>
+          </a:custGeom>
+        </p:spPr>
+      </p:sp>
+      <p:sp>
+        <p:nvSpPr>
+          <p:cNvPr id="71" name="Shape 71"/>
+          <p:cNvSpPr txBox="1"/>
+          <p:nvPr>
+            <p:ph idx="1" type="body"/>
+          </p:nvPr>
+        </p:nvSpPr>
+        <p:spPr>
+          <a:xfrm>
+            <a:off x="685800" y="4343400"/>
+            <a:ext cx="5486400" cy="4114800"/>
+          </a:xfrm>
+          <a:prstGeom prst="rect">
+            <a:avLst/>
+          </a:prstGeom>
+        </p:spPr>
+        <p:txBody>
+          <a:bodyPr anchorCtr="0" anchor="t" bIns="91425" lIns="91425" rIns="91425" tIns="91425">
+            <a:noAutofit/>
+          </a:bodyPr>
+          <a:lstStyle/>
+          <a:p>
+            <a:pPr lvl="0">
+              <a:spcBef>
+                <a:spcPts val="0"/>
+              </a:spcBef>
+              <a:buNone/>
+            </a:pPr>
+            <a:r>
+              <a:t/>
+            </a:r>
+            <a:endParaRPr/>
+          </a:p>
+        </p:txBody>
+      </p:sp>
+    </p:spTree>
+  </p:cSld>
+  <p:clrMapOvr>
+    <a:masterClrMapping/>
+  </p:clrMapOvr>
+</p:notes>
+</file>
+
+<file path=ppt/notesSlides/notesSlide3.xml><?xml version="1.0" encoding="utf-8"?>
+<p:notes xmlns:a="http://schemas.openxmlformats.org/drawingml/2006/main" xmlns:r="http://schemas.openxmlformats.org/officeDocument/2006/relationships" xmlns:mc="http://schemas.openxmlformats.org/markup-compatibility/2006" xmlns:mv="urn:schemas-microsoft-com:mac:vml" xmlns:p="http://schemas.openxmlformats.org/presentationml/2006/main" xmlns:c="http://schemas.openxmlformats.org/drawingml/2006/chart" xmlns:dgm="http://schemas.openxmlformats.org/drawingml/2006/diagram" xmlns:o="urn:schemas-microsoft-com:office:office" xmlns:v="urn:schemas-microsoft-com:vml" xmlns:pvml="urn:schemas-microsoft-com:office:powerpoint" xmlns:com="http://schemas.openxmlformats.org/drawingml/2006/compatibility" xmlns:p14="http://schemas.microsoft.com/office/powerpoint/2010/main" showMasterPhAnim="0" showMasterSp="0">
+  <p:cSld>
+    <p:spTree>
+      <p:nvGrpSpPr>
+        <p:cNvPr id="77" name="Shape 77"/>
+        <p:cNvGrpSpPr/>
+        <p:nvPr/>
+      </p:nvGrpSpPr>
+      <p:grpSpPr>
+        <a:xfrm>
+          <a:off x="0" y="0"/>
+          <a:ext cx="0" cy="0"/>
+          <a:chOff x="0" y="0"/>
+          <a:chExt cx="0" cy="0"/>
+        </a:xfrm>
+      </p:grpSpPr>
+      <p:sp>
+        <p:nvSpPr>
+          <p:cNvPr id="78" name="Shape 78"/>
+          <p:cNvSpPr/>
+          <p:nvPr>
+            <p:ph idx="2" type="sldImg"/>
+          </p:nvPr>
+        </p:nvSpPr>
+        <p:spPr>
+          <a:xfrm>
+            <a:off x="381300" y="685800"/>
+            <a:ext cx="6096000" cy="3429000"/>
+          </a:xfrm>
+          <a:custGeom>
+            <a:pathLst>
+              <a:path extrusionOk="0" h="120000" w="120000">
+                <a:moveTo>
+                  <a:pt x="0" y="0"/>
+                </a:moveTo>
+                <a:lnTo>
+                  <a:pt x="120000" y="0"/>
+                </a:lnTo>
+                <a:lnTo>
+                  <a:pt x="120000" y="120000"/>
+                </a:lnTo>
+                <a:lnTo>
+                  <a:pt x="0" y="120000"/>
+                </a:lnTo>
+                <a:close/>
+              </a:path>
+            </a:pathLst>
+          </a:custGeom>
+        </p:spPr>
+      </p:sp>
+      <p:sp>
+        <p:nvSpPr>
+          <p:cNvPr id="79" name="Shape 79"/>
           <p:cNvSpPr txBox="1"/>
           <p:nvPr>
             <p:ph idx="1" type="body"/>
@@ -4938,9 +5130,221 @@
           </a:p>
         </p:txBody>
       </p:sp>
+    </p:spTree>
+  </p:cSld>
+  <p:clrMapOvr>
+    <a:masterClrMapping/>
+  </p:clrMapOvr>
+</p:sld>
+</file>
+
+<file path=ppt/slides/slide2.xml><?xml version="1.0" encoding="utf-8"?>
+<p:sld xmlns:a="http://schemas.openxmlformats.org/drawingml/2006/main" xmlns:r="http://schemas.openxmlformats.org/officeDocument/2006/relationships" xmlns:mc="http://schemas.openxmlformats.org/markup-compatibility/2006" xmlns:mv="urn:schemas-microsoft-com:mac:vml" xmlns:p="http://schemas.openxmlformats.org/presentationml/2006/main" xmlns:c="http://schemas.openxmlformats.org/drawingml/2006/chart" xmlns:dgm="http://schemas.openxmlformats.org/drawingml/2006/diagram" xmlns:o="urn:schemas-microsoft-com:office:office" xmlns:v="urn:schemas-microsoft-com:vml" xmlns:pvml="urn:schemas-microsoft-com:office:powerpoint" xmlns:com="http://schemas.openxmlformats.org/drawingml/2006/compatibility" xmlns:p14="http://schemas.microsoft.com/office/powerpoint/2010/main">
+  <p:cSld>
+    <p:spTree>
+      <p:nvGrpSpPr>
+        <p:cNvPr id="72" name="Shape 72"/>
+        <p:cNvGrpSpPr/>
+        <p:nvPr/>
+      </p:nvGrpSpPr>
+      <p:grpSpPr>
+        <a:xfrm>
+          <a:off x="0" y="0"/>
+          <a:ext cx="0" cy="0"/>
+          <a:chOff x="0" y="0"/>
+          <a:chExt cx="0" cy="0"/>
+        </a:xfrm>
+      </p:grpSpPr>
+      <p:sp>
+        <p:nvSpPr>
+          <p:cNvPr id="73" name="Shape 73"/>
+          <p:cNvSpPr txBox="1"/>
+          <p:nvPr>
+            <p:ph type="title"/>
+          </p:nvPr>
+        </p:nvSpPr>
+        <p:spPr>
+          <a:xfrm>
+            <a:off x="471900" y="738725"/>
+            <a:ext cx="8222100" cy="767700"/>
+          </a:xfrm>
+          <a:prstGeom prst="rect">
+            <a:avLst/>
+          </a:prstGeom>
+        </p:spPr>
+        <p:txBody>
+          <a:bodyPr anchorCtr="0" anchor="b" bIns="91425" lIns="91425" rIns="91425" tIns="91425">
+            <a:noAutofit/>
+          </a:bodyPr>
+          <a:lstStyle/>
+          <a:p>
+            <a:pPr lvl="0">
+              <a:spcBef>
+                <a:spcPts val="0"/>
+              </a:spcBef>
+              <a:buNone/>
+            </a:pPr>
+            <a:r>
+              <a:rPr lang="en"/>
+              <a:t>Virtual Assistant</a:t>
+            </a:r>
+          </a:p>
+        </p:txBody>
+      </p:sp>
+      <p:sp>
+        <p:nvSpPr>
+          <p:cNvPr id="74" name="Shape 74"/>
+          <p:cNvSpPr txBox="1"/>
+          <p:nvPr>
+            <p:ph idx="1" type="body"/>
+          </p:nvPr>
+        </p:nvSpPr>
+        <p:spPr>
+          <a:xfrm>
+            <a:off x="471900" y="1919075"/>
+            <a:ext cx="8222100" cy="2710200"/>
+          </a:xfrm>
+          <a:prstGeom prst="rect">
+            <a:avLst/>
+          </a:prstGeom>
+        </p:spPr>
+        <p:txBody>
+          <a:bodyPr anchorCtr="0" anchor="t" bIns="91425" lIns="91425" rIns="91425" tIns="91425">
+            <a:noAutofit/>
+          </a:bodyPr>
+          <a:lstStyle/>
+          <a:p>
+            <a:pPr lvl="0">
+              <a:spcBef>
+                <a:spcPts val="0"/>
+              </a:spcBef>
+              <a:buNone/>
+            </a:pPr>
+            <a:r>
+              <a:rPr lang="en"/>
+              <a:t> </a:t>
+            </a:r>
+          </a:p>
+        </p:txBody>
+      </p:sp>
       <p:pic>
         <p:nvPicPr>
-          <p:cNvPr id="69" name="Shape 69"/>
+          <p:cNvPr id="75" name="Shape 75"/>
+          <p:cNvPicPr preferRelativeResize="0"/>
+          <p:nvPr/>
+        </p:nvPicPr>
+        <p:blipFill rotWithShape="1">
+          <a:blip r:embed="rId3">
+            <a:alphaModFix/>
+          </a:blip>
+          <a:srcRect b="8234" l="16505" r="17443" t="6251"/>
+          <a:stretch/>
+        </p:blipFill>
+        <p:spPr>
+          <a:xfrm>
+            <a:off x="230800" y="1919074"/>
+            <a:ext cx="3419251" cy="2489923"/>
+          </a:xfrm>
+          <a:prstGeom prst="rect">
+            <a:avLst/>
+          </a:prstGeom>
+          <a:noFill/>
+          <a:ln>
+            <a:noFill/>
+          </a:ln>
+        </p:spPr>
+      </p:pic>
+      <p:pic>
+        <p:nvPicPr>
+          <p:cNvPr id="76" name="Shape 76"/>
+          <p:cNvPicPr preferRelativeResize="0"/>
+          <p:nvPr/>
+        </p:nvPicPr>
+        <p:blipFill rotWithShape="1">
+          <a:blip r:embed="rId4">
+            <a:alphaModFix/>
+          </a:blip>
+          <a:srcRect b="7935" l="0" r="0" t="6271"/>
+          <a:stretch/>
+        </p:blipFill>
+        <p:spPr>
+          <a:xfrm>
+            <a:off x="3717100" y="1919074"/>
+            <a:ext cx="5159414" cy="2489923"/>
+          </a:xfrm>
+          <a:prstGeom prst="rect">
+            <a:avLst/>
+          </a:prstGeom>
+          <a:noFill/>
+          <a:ln>
+            <a:noFill/>
+          </a:ln>
+        </p:spPr>
+      </p:pic>
+    </p:spTree>
+  </p:cSld>
+  <p:clrMapOvr>
+    <a:masterClrMapping/>
+  </p:clrMapOvr>
+</p:sld>
+</file>
+
+<file path=ppt/slides/slide3.xml><?xml version="1.0" encoding="utf-8"?>
+<p:sld xmlns:a="http://schemas.openxmlformats.org/drawingml/2006/main" xmlns:r="http://schemas.openxmlformats.org/officeDocument/2006/relationships" xmlns:mc="http://schemas.openxmlformats.org/markup-compatibility/2006" xmlns:mv="urn:schemas-microsoft-com:mac:vml" xmlns:p="http://schemas.openxmlformats.org/presentationml/2006/main" xmlns:c="http://schemas.openxmlformats.org/drawingml/2006/chart" xmlns:dgm="http://schemas.openxmlformats.org/drawingml/2006/diagram" xmlns:o="urn:schemas-microsoft-com:office:office" xmlns:v="urn:schemas-microsoft-com:vml" xmlns:pvml="urn:schemas-microsoft-com:office:powerpoint" xmlns:com="http://schemas.openxmlformats.org/drawingml/2006/compatibility" xmlns:p14="http://schemas.microsoft.com/office/powerpoint/2010/main">
+  <p:cSld>
+    <p:spTree>
+      <p:nvGrpSpPr>
+        <p:cNvPr id="80" name="Shape 80"/>
+        <p:cNvGrpSpPr/>
+        <p:nvPr/>
+      </p:nvGrpSpPr>
+      <p:grpSpPr>
+        <a:xfrm>
+          <a:off x="0" y="0"/>
+          <a:ext cx="0" cy="0"/>
+          <a:chOff x="0" y="0"/>
+          <a:chExt cx="0" cy="0"/>
+        </a:xfrm>
+      </p:grpSpPr>
+      <p:sp>
+        <p:nvSpPr>
+          <p:cNvPr id="81" name="Shape 81"/>
+          <p:cNvSpPr txBox="1"/>
+          <p:nvPr>
+            <p:ph type="title"/>
+          </p:nvPr>
+        </p:nvSpPr>
+        <p:spPr>
+          <a:xfrm>
+            <a:off x="471900" y="738725"/>
+            <a:ext cx="8222100" cy="767700"/>
+          </a:xfrm>
+          <a:prstGeom prst="rect">
+            <a:avLst/>
+          </a:prstGeom>
+        </p:spPr>
+        <p:txBody>
+          <a:bodyPr anchorCtr="0" anchor="b" bIns="91425" lIns="91425" rIns="91425" tIns="91425">
+            <a:noAutofit/>
+          </a:bodyPr>
+          <a:lstStyle/>
+          <a:p>
+            <a:pPr lvl="0">
+              <a:spcBef>
+                <a:spcPts val="0"/>
+              </a:spcBef>
+              <a:buNone/>
+            </a:pPr>
+            <a:r>
+              <a:rPr lang="en"/>
+              <a:t>Virtual Assistant</a:t>
+            </a:r>
+          </a:p>
+        </p:txBody>
+      </p:sp>
+      <p:pic>
+        <p:nvPicPr>
+          <p:cNvPr id="82" name="Shape 82"/>
           <p:cNvPicPr preferRelativeResize="0"/>
           <p:nvPr/>
         </p:nvPicPr>
@@ -4954,8 +5358,8 @@
         </p:blipFill>
         <p:spPr>
           <a:xfrm>
-            <a:off x="5559245" y="1417145"/>
-            <a:ext cx="3569799" cy="2309200"/>
+            <a:off x="5352100" y="1861074"/>
+            <a:ext cx="3341899" cy="2943099"/>
           </a:xfrm>
           <a:prstGeom prst="rect">
             <a:avLst/>
@@ -4968,48 +5372,22 @@
       </p:pic>
       <p:pic>
         <p:nvPicPr>
-          <p:cNvPr id="70" name="Shape 70"/>
+          <p:cNvPr id="83" name="Shape 83"/>
           <p:cNvPicPr preferRelativeResize="0"/>
           <p:nvPr/>
         </p:nvPicPr>
-        <p:blipFill rotWithShape="1">
+        <p:blipFill>
           <a:blip r:embed="rId4">
             <a:alphaModFix/>
           </a:blip>
-          <a:srcRect b="34377" l="3725" r="36860" t="52289"/>
-          <a:stretch/>
+          <a:stretch>
+            <a:fillRect/>
+          </a:stretch>
         </p:blipFill>
         <p:spPr>
           <a:xfrm>
-            <a:off x="109750" y="4327025"/>
-            <a:ext cx="4074449" cy="685774"/>
-          </a:xfrm>
-          <a:prstGeom prst="rect">
-            <a:avLst/>
-          </a:prstGeom>
-          <a:noFill/>
-          <a:ln>
-            <a:noFill/>
-          </a:ln>
-        </p:spPr>
-      </p:pic>
-      <p:pic>
-        <p:nvPicPr>
-          <p:cNvPr id="71" name="Shape 71"/>
-          <p:cNvPicPr preferRelativeResize="0"/>
-          <p:nvPr/>
-        </p:nvPicPr>
-        <p:blipFill rotWithShape="1">
-          <a:blip r:embed="rId5">
-            <a:alphaModFix/>
-          </a:blip>
-          <a:srcRect b="50412" l="5227" r="5558" t="22976"/>
-          <a:stretch/>
-        </p:blipFill>
-        <p:spPr>
-          <a:xfrm>
-            <a:off x="4554885" y="4128100"/>
-            <a:ext cx="3954664" cy="884699"/>
+            <a:off x="471900" y="1861075"/>
+            <a:ext cx="4549769" cy="2943099"/>
           </a:xfrm>
           <a:prstGeom prst="rect">
             <a:avLst/>

</xml_diff>